<commit_message>
Update website_map: Add comment to superadmin
</commit_message>
<xml_diff>
--- a/design/website_map.pptx
+++ b/design/website_map.pptx
@@ -1242,6 +1242,28 @@
             <a:t>DASHBOARD</a:t>
           </a:r>
         </a:p>
+        <a:p>
+          <a:r>
+            <a:rPr lang="es-CO" b="1" dirty="0">
+              <a:solidFill>
+                <a:schemeClr val="tx1">
+                  <a:lumMod val="65000"/>
+                  <a:lumOff val="35000"/>
+                </a:schemeClr>
+              </a:solidFill>
+              <a:effectLst>
+                <a:outerShdw blurRad="50800" dist="38100" dir="5400000" algn="t" rotWithShape="0">
+                  <a:prstClr val="black">
+                    <a:alpha val="40000"/>
+                  </a:prstClr>
+                </a:outerShdw>
+              </a:effectLst>
+              <a:latin typeface="Arial" panose="020B0604020202020204" pitchFamily="34" charset="0"/>
+              <a:cs typeface="Arial" panose="020B0604020202020204" pitchFamily="34" charset="0"/>
+            </a:rPr>
+            <a:t>El administrador tiene acceso a todas las vistas</a:t>
+          </a:r>
+        </a:p>
       </dgm:t>
     </dgm:pt>
     <dgm:pt modelId="{9BDB9051-6776-474D-9E44-13745B1ACB46}" type="parTrans" cxnId="{9E55B364-83DC-4F70-9452-CFCC14AECB27}">
@@ -2550,7 +2572,7 @@
       <dgm:spPr/>
     </dgm:pt>
     <dgm:pt modelId="{715AC28F-2566-48E2-B794-80EA6DF139D8}" type="pres">
-      <dgm:prSet presAssocID="{672264A8-00CA-4C25-8303-38C8BB229BD1}" presName="rootText" presStyleLbl="node3" presStyleIdx="0" presStyleCnt="3" custScaleX="117180" custScaleY="157028" custLinFactNeighborX="-9079">
+      <dgm:prSet presAssocID="{672264A8-00CA-4C25-8303-38C8BB229BD1}" presName="rootText" presStyleLbl="node3" presStyleIdx="0" presStyleCnt="3" custScaleX="117180" custScaleY="294625" custLinFactNeighborX="-9079">
         <dgm:presLayoutVars>
           <dgm:chPref val="3"/>
         </dgm:presLayoutVars>
@@ -3162,7 +3184,7 @@
       </dsp:nvSpPr>
       <dsp:spPr>
         <a:xfrm>
-          <a:off x="1497365" y="1537276"/>
+          <a:off x="1497365" y="1403209"/>
           <a:ext cx="194570" cy="3438030"/>
         </a:xfrm>
         <a:custGeom>
@@ -3276,8 +3298,8 @@
       </dsp:nvSpPr>
       <dsp:spPr>
         <a:xfrm>
-          <a:off x="3189302" y="1536642"/>
-          <a:ext cx="209219" cy="3440097"/>
+          <a:off x="3189302" y="1402574"/>
+          <a:ext cx="209219" cy="3574165"/>
         </a:xfrm>
         <a:custGeom>
           <a:avLst/>
@@ -3294,10 +3316,10 @@
                 <a:pt x="81436" y="0"/>
               </a:lnTo>
               <a:lnTo>
-                <a:pt x="81436" y="3440097"/>
+                <a:pt x="81436" y="3574165"/>
               </a:lnTo>
               <a:lnTo>
-                <a:pt x="209219" y="3440097"/>
+                <a:pt x="209219" y="3574165"/>
               </a:lnTo>
             </a:path>
           </a:pathLst>
@@ -3681,8 +3703,8 @@
       </dsp:nvSpPr>
       <dsp:spPr>
         <a:xfrm>
-          <a:off x="3189302" y="1536642"/>
-          <a:ext cx="209219" cy="1896639"/>
+          <a:off x="3189302" y="1402574"/>
+          <a:ext cx="209219" cy="2030707"/>
         </a:xfrm>
         <a:custGeom>
           <a:avLst/>
@@ -3699,10 +3721,10 @@
                 <a:pt x="81436" y="0"/>
               </a:lnTo>
               <a:lnTo>
-                <a:pt x="81436" y="1896639"/>
+                <a:pt x="81436" y="2030707"/>
               </a:lnTo>
               <a:lnTo>
-                <a:pt x="209219" y="1896639"/>
+                <a:pt x="209219" y="2030707"/>
               </a:lnTo>
             </a:path>
           </a:pathLst>
@@ -3798,8 +3820,8 @@
       </dsp:nvSpPr>
       <dsp:spPr>
         <a:xfrm>
-          <a:off x="3189302" y="1536642"/>
-          <a:ext cx="209168" cy="739045"/>
+          <a:off x="3189302" y="1402574"/>
+          <a:ext cx="209168" cy="873113"/>
         </a:xfrm>
         <a:custGeom>
           <a:avLst/>
@@ -3816,10 +3838,10 @@
                 <a:pt x="81385" y="0"/>
               </a:lnTo>
               <a:lnTo>
-                <a:pt x="81385" y="739045"/>
+                <a:pt x="81385" y="873113"/>
               </a:lnTo>
               <a:lnTo>
-                <a:pt x="209168" y="739045"/>
+                <a:pt x="209168" y="873113"/>
               </a:lnTo>
             </a:path>
           </a:pathLst>
@@ -3858,7 +3880,7 @@
       </dsp:nvSpPr>
       <dsp:spPr>
         <a:xfrm>
-          <a:off x="1497365" y="1490922"/>
+          <a:off x="1497365" y="1356854"/>
           <a:ext cx="194570" cy="91440"/>
         </a:xfrm>
         <a:custGeom>
@@ -3918,7 +3940,7 @@
       </dsp:nvSpPr>
       <dsp:spPr>
         <a:xfrm>
-          <a:off x="0" y="1231276"/>
+          <a:off x="0" y="1097209"/>
           <a:ext cx="1497365" cy="611999"/>
         </a:xfrm>
         <a:prstGeom prst="rect">
@@ -3999,7 +4021,7 @@
         </a:p>
       </dsp:txBody>
       <dsp:txXfrm>
-        <a:off x="0" y="1231276"/>
+        <a:off x="0" y="1097209"/>
         <a:ext cx="1497365" cy="611999"/>
       </dsp:txXfrm>
     </dsp:sp>
@@ -4010,7 +4032,7 @@
       </dsp:nvSpPr>
       <dsp:spPr>
         <a:xfrm>
-          <a:off x="1691936" y="1230642"/>
+          <a:off x="1691936" y="1096574"/>
           <a:ext cx="1497365" cy="611999"/>
         </a:xfrm>
         <a:prstGeom prst="rect">
@@ -4091,7 +4113,7 @@
         </a:p>
       </dsp:txBody>
       <dsp:txXfrm>
-        <a:off x="1691936" y="1230642"/>
+        <a:off x="1691936" y="1096574"/>
         <a:ext cx="1497365" cy="611999"/>
       </dsp:txXfrm>
     </dsp:sp>
@@ -4102,8 +4124,8 @@
       </dsp:nvSpPr>
       <dsp:spPr>
         <a:xfrm>
-          <a:off x="3398470" y="1969688"/>
-          <a:ext cx="1497365" cy="611999"/>
+          <a:off x="3398470" y="1701553"/>
+          <a:ext cx="1497365" cy="1148269"/>
         </a:xfrm>
         <a:prstGeom prst="rect">
           <a:avLst/>
@@ -4196,10 +4218,44 @@
             <a:t>DASHBOARD</a:t>
           </a:r>
         </a:p>
+        <a:p>
+          <a:pPr marL="0" lvl="0" indent="0" algn="ctr" defTabSz="577850">
+            <a:lnSpc>
+              <a:spcPct val="90000"/>
+            </a:lnSpc>
+            <a:spcBef>
+              <a:spcPct val="0"/>
+            </a:spcBef>
+            <a:spcAft>
+              <a:spcPct val="35000"/>
+            </a:spcAft>
+            <a:buNone/>
+          </a:pPr>
+          <a:r>
+            <a:rPr lang="es-CO" sz="1300" b="1" kern="1200" dirty="0">
+              <a:solidFill>
+                <a:schemeClr val="tx1">
+                  <a:lumMod val="65000"/>
+                  <a:lumOff val="35000"/>
+                </a:schemeClr>
+              </a:solidFill>
+              <a:effectLst>
+                <a:outerShdw blurRad="50800" dist="38100" dir="5400000" algn="t" rotWithShape="0">
+                  <a:prstClr val="black">
+                    <a:alpha val="40000"/>
+                  </a:prstClr>
+                </a:outerShdw>
+              </a:effectLst>
+              <a:latin typeface="Arial" panose="020B0604020202020204" pitchFamily="34" charset="0"/>
+              <a:cs typeface="Arial" panose="020B0604020202020204" pitchFamily="34" charset="0"/>
+            </a:rPr>
+            <a:t>El administrador tiene acceso a todas las vistas</a:t>
+          </a:r>
+        </a:p>
       </dsp:txBody>
       <dsp:txXfrm>
-        <a:off x="3398470" y="1969688"/>
-        <a:ext cx="1497365" cy="611999"/>
+        <a:off x="3398470" y="1701553"/>
+        <a:ext cx="1497365" cy="1148269"/>
       </dsp:txXfrm>
     </dsp:sp>
     <dsp:sp modelId="{9543B84D-3162-432A-816B-E630AFE07596}">
@@ -5318,7 +5374,7 @@
       </dsp:nvSpPr>
       <dsp:spPr>
         <a:xfrm>
-          <a:off x="1691936" y="4669307"/>
+          <a:off x="1691936" y="4535239"/>
           <a:ext cx="1497365" cy="611999"/>
         </a:xfrm>
         <a:prstGeom prst="rect">
@@ -5396,7 +5452,7 @@
         </a:p>
       </dsp:txBody>
       <dsp:txXfrm>
-        <a:off x="1691936" y="4669307"/>
+        <a:off x="1691936" y="4535239"/>
         <a:ext cx="1497365" cy="611999"/>
       </dsp:txXfrm>
     </dsp:sp>
@@ -10870,7 +10926,7 @@
           <p:nvPr>
             <p:extLst>
               <p:ext uri="{D42A27DB-BD31-4B8C-83A1-F6EECF244321}">
-                <p14:modId xmlns:p14="http://schemas.microsoft.com/office/powerpoint/2010/main" val="3566308584"/>
+                <p14:modId xmlns:p14="http://schemas.microsoft.com/office/powerpoint/2010/main" val="3526220252"/>
               </p:ext>
             </p:extLst>
           </p:nvPr>

</xml_diff>